<commit_message>
Updating phase 1 project
</commit_message>
<xml_diff>
--- a/Presentation.ppt.pptx
+++ b/Presentation.ppt.pptx
@@ -3639,234 +3639,6 @@
       </p:grpSpPr>
       <p:sp>
         <p:nvSpPr>
-          <p:cNvPr id="5" name="TextBox 4">
-            <a:extLst>
-              <a:ext uri="{FF2B5EF4-FFF2-40B4-BE49-F238E27FC236}">
-                <a16:creationId xmlns:a16="http://schemas.microsoft.com/office/drawing/2014/main" id="{75D5C6FA-A8AD-ED18-B05D-80E2CA558B5F}"/>
-              </a:ext>
-            </a:extLst>
-          </p:cNvPr>
-          <p:cNvSpPr txBox="1"/>
-          <p:nvPr/>
-        </p:nvSpPr>
-        <p:spPr>
-          <a:xfrm>
-            <a:off x="3047215" y="3246690"/>
-            <a:ext cx="6094428" cy="369332"/>
-          </a:xfrm>
-          <a:prstGeom prst="rect">
-            <a:avLst/>
-          </a:prstGeom>
-          <a:noFill/>
-        </p:spPr>
-        <p:txBody>
-          <a:bodyPr wrap="square">
-            <a:spAutoFit/>
-          </a:bodyPr>
-          <a:lstStyle/>
-          <a:p>
-            <a:r>
-              <a:rPr lang="en-US" b="0" dirty="0">
-                <a:effectLst/>
-              </a:rPr>
-              <a:t> </a:t>
-            </a:r>
-            <a:endParaRPr lang="en-US" dirty="0"/>
-          </a:p>
-        </p:txBody>
-      </p:sp>
-      <p:sp>
-        <p:nvSpPr>
-          <p:cNvPr id="7" name="TextBox 6">
-            <a:extLst>
-              <a:ext uri="{FF2B5EF4-FFF2-40B4-BE49-F238E27FC236}">
-                <a16:creationId xmlns:a16="http://schemas.microsoft.com/office/drawing/2014/main" id="{C0CABFA4-E81C-2643-1F8C-73EE9B2787F5}"/>
-              </a:ext>
-            </a:extLst>
-          </p:cNvPr>
-          <p:cNvSpPr txBox="1"/>
-          <p:nvPr/>
-        </p:nvSpPr>
-        <p:spPr>
-          <a:xfrm>
-            <a:off x="3047215" y="3246690"/>
-            <a:ext cx="6094428" cy="369332"/>
-          </a:xfrm>
-          <a:prstGeom prst="rect">
-            <a:avLst/>
-          </a:prstGeom>
-          <a:noFill/>
-        </p:spPr>
-        <p:txBody>
-          <a:bodyPr wrap="square">
-            <a:spAutoFit/>
-          </a:bodyPr>
-          <a:lstStyle/>
-          <a:p>
-            <a:r>
-              <a:rPr lang="en-US" b="0" dirty="0">
-                <a:effectLst/>
-              </a:rPr>
-              <a:t> </a:t>
-            </a:r>
-            <a:endParaRPr lang="en-US" dirty="0"/>
-          </a:p>
-        </p:txBody>
-      </p:sp>
-      <p:sp>
-        <p:nvSpPr>
-          <p:cNvPr id="9" name="TextBox 8">
-            <a:extLst>
-              <a:ext uri="{FF2B5EF4-FFF2-40B4-BE49-F238E27FC236}">
-                <a16:creationId xmlns:a16="http://schemas.microsoft.com/office/drawing/2014/main" id="{C89AE4F8-F29E-4835-215D-1CA006BDB3D0}"/>
-              </a:ext>
-            </a:extLst>
-          </p:cNvPr>
-          <p:cNvSpPr txBox="1"/>
-          <p:nvPr/>
-        </p:nvSpPr>
-        <p:spPr>
-          <a:xfrm>
-            <a:off x="3047215" y="3246690"/>
-            <a:ext cx="6094428" cy="369332"/>
-          </a:xfrm>
-          <a:prstGeom prst="rect">
-            <a:avLst/>
-          </a:prstGeom>
-          <a:noFill/>
-        </p:spPr>
-        <p:txBody>
-          <a:bodyPr wrap="square">
-            <a:spAutoFit/>
-          </a:bodyPr>
-          <a:lstStyle/>
-          <a:p>
-            <a:r>
-              <a:rPr lang="en-US" b="0" dirty="0">
-                <a:effectLst/>
-              </a:rPr>
-              <a:t> </a:t>
-            </a:r>
-            <a:endParaRPr lang="en-US" dirty="0"/>
-          </a:p>
-        </p:txBody>
-      </p:sp>
-      <p:sp>
-        <p:nvSpPr>
-          <p:cNvPr id="11" name="TextBox 10">
-            <a:extLst>
-              <a:ext uri="{FF2B5EF4-FFF2-40B4-BE49-F238E27FC236}">
-                <a16:creationId xmlns:a16="http://schemas.microsoft.com/office/drawing/2014/main" id="{18721E14-648F-1D9F-912B-2D010229EA42}"/>
-              </a:ext>
-            </a:extLst>
-          </p:cNvPr>
-          <p:cNvSpPr txBox="1"/>
-          <p:nvPr/>
-        </p:nvSpPr>
-        <p:spPr>
-          <a:xfrm>
-            <a:off x="3047215" y="3246690"/>
-            <a:ext cx="6094428" cy="369332"/>
-          </a:xfrm>
-          <a:prstGeom prst="rect">
-            <a:avLst/>
-          </a:prstGeom>
-          <a:noFill/>
-        </p:spPr>
-        <p:txBody>
-          <a:bodyPr wrap="square">
-            <a:spAutoFit/>
-          </a:bodyPr>
-          <a:lstStyle/>
-          <a:p>
-            <a:r>
-              <a:rPr lang="en-US" b="0" dirty="0">
-                <a:effectLst/>
-              </a:rPr>
-              <a:t> </a:t>
-            </a:r>
-            <a:endParaRPr lang="en-US" dirty="0"/>
-          </a:p>
-        </p:txBody>
-      </p:sp>
-      <p:sp>
-        <p:nvSpPr>
-          <p:cNvPr id="15" name="TextBox 14">
-            <a:extLst>
-              <a:ext uri="{FF2B5EF4-FFF2-40B4-BE49-F238E27FC236}">
-                <a16:creationId xmlns:a16="http://schemas.microsoft.com/office/drawing/2014/main" id="{0E2BEADF-87FD-0532-138E-7AC1091CA562}"/>
-              </a:ext>
-            </a:extLst>
-          </p:cNvPr>
-          <p:cNvSpPr txBox="1"/>
-          <p:nvPr/>
-        </p:nvSpPr>
-        <p:spPr>
-          <a:xfrm>
-            <a:off x="3047215" y="3246690"/>
-            <a:ext cx="6094428" cy="369332"/>
-          </a:xfrm>
-          <a:prstGeom prst="rect">
-            <a:avLst/>
-          </a:prstGeom>
-          <a:noFill/>
-        </p:spPr>
-        <p:txBody>
-          <a:bodyPr wrap="square">
-            <a:spAutoFit/>
-          </a:bodyPr>
-          <a:lstStyle/>
-          <a:p>
-            <a:r>
-              <a:rPr lang="en-US" b="0">
-                <a:effectLst/>
-              </a:rPr>
-              <a:t> </a:t>
-            </a:r>
-            <a:endParaRPr lang="en-US" dirty="0"/>
-          </a:p>
-        </p:txBody>
-      </p:sp>
-      <p:sp>
-        <p:nvSpPr>
-          <p:cNvPr id="19" name="TextBox 18">
-            <a:extLst>
-              <a:ext uri="{FF2B5EF4-FFF2-40B4-BE49-F238E27FC236}">
-                <a16:creationId xmlns:a16="http://schemas.microsoft.com/office/drawing/2014/main" id="{F3037BBF-90A9-5630-BFCF-D1763E8247A1}"/>
-              </a:ext>
-            </a:extLst>
-          </p:cNvPr>
-          <p:cNvSpPr txBox="1"/>
-          <p:nvPr/>
-        </p:nvSpPr>
-        <p:spPr>
-          <a:xfrm>
-            <a:off x="3046751" y="3240586"/>
-            <a:ext cx="6093500" cy="369332"/>
-          </a:xfrm>
-          <a:prstGeom prst="rect">
-            <a:avLst/>
-          </a:prstGeom>
-          <a:noFill/>
-        </p:spPr>
-        <p:txBody>
-          <a:bodyPr wrap="square">
-            <a:spAutoFit/>
-          </a:bodyPr>
-          <a:lstStyle/>
-          <a:p>
-            <a:r>
-              <a:rPr lang="en-US" b="0" dirty="0">
-                <a:effectLst/>
-              </a:rPr>
-              <a:t> </a:t>
-            </a:r>
-            <a:endParaRPr lang="en-US" dirty="0"/>
-          </a:p>
-        </p:txBody>
-      </p:sp>
-      <p:sp>
-        <p:nvSpPr>
           <p:cNvPr id="6" name="Title 5">
             <a:extLst>
               <a:ext uri="{FF2B5EF4-FFF2-40B4-BE49-F238E27FC236}">
@@ -3881,7 +3653,12 @@
             <p:ph type="ctrTitle"/>
           </p:nvPr>
         </p:nvSpPr>
-        <p:spPr/>
+        <p:spPr>
+          <a:xfrm>
+            <a:off x="2417779" y="0"/>
+            <a:ext cx="8637073" cy="2541431"/>
+          </a:xfrm>
+        </p:spPr>
         <p:txBody>
           <a:bodyPr/>
           <a:lstStyle/>
@@ -4118,8 +3895,8 @@
         </p:blipFill>
         <p:spPr bwMode="auto">
           <a:xfrm>
-            <a:off x="5306772" y="1690688"/>
-            <a:ext cx="5861154" cy="4469202"/>
+            <a:off x="5306771" y="609599"/>
+            <a:ext cx="6925781" cy="5443881"/>
           </a:xfrm>
           <a:prstGeom prst="rect">
             <a:avLst/>
@@ -4547,99 +4324,97 @@
       </p:grpSpPr>
       <p:sp>
         <p:nvSpPr>
-          <p:cNvPr id="5" name="Title 4">
+          <p:cNvPr id="2" name="TextBox 1">
             <a:extLst>
               <a:ext uri="{FF2B5EF4-FFF2-40B4-BE49-F238E27FC236}">
-                <a16:creationId xmlns:a16="http://schemas.microsoft.com/office/drawing/2014/main" id="{EAF1DCA8-677E-E384-0F90-25ED6C35A750}"/>
+                <a16:creationId xmlns:a16="http://schemas.microsoft.com/office/drawing/2014/main" id="{DAD45BD5-0B9B-CA19-1002-CC561DF1A977}"/>
               </a:ext>
             </a:extLst>
           </p:cNvPr>
-          <p:cNvSpPr>
-            <a:spLocks noGrp="1"/>
-          </p:cNvSpPr>
-          <p:nvPr>
-            <p:ph type="title"/>
-          </p:nvPr>
-        </p:nvSpPr>
-        <p:spPr/>
-        <p:txBody>
-          <a:bodyPr/>
-          <a:lstStyle/>
-          <a:p>
-            <a:endParaRPr lang="en-US"/>
-          </a:p>
-        </p:txBody>
-      </p:sp>
-      <p:sp>
-        <p:nvSpPr>
-          <p:cNvPr id="3" name="Content Placeholder 2">
+          <p:cNvSpPr txBox="1"/>
+          <p:nvPr/>
+        </p:nvSpPr>
+        <p:spPr>
+          <a:xfrm>
+            <a:off x="3164541" y="349623"/>
+            <a:ext cx="5638799" cy="707886"/>
+          </a:xfrm>
+          <a:prstGeom prst="rect">
+            <a:avLst/>
+          </a:prstGeom>
+          <a:noFill/>
+        </p:spPr>
+        <p:txBody>
+          <a:bodyPr wrap="square" rtlCol="0">
+            <a:spAutoFit/>
+          </a:bodyPr>
+          <a:lstStyle/>
+          <a:p>
+            <a:r>
+              <a:rPr lang="en-US" sz="4000" dirty="0"/>
+              <a:t>Limitations of Study</a:t>
+            </a:r>
+            <a:endParaRPr lang="en-US" sz="4000" kern="1200" dirty="0">
+              <a:solidFill>
+                <a:schemeClr val="tx1"/>
+              </a:solidFill>
+              <a:latin typeface="+mn-lt"/>
+              <a:ea typeface="+mn-ea"/>
+              <a:cs typeface="+mn-cs"/>
+            </a:endParaRPr>
+          </a:p>
+        </p:txBody>
+      </p:sp>
+      <p:sp>
+        <p:nvSpPr>
+          <p:cNvPr id="4" name="TextBox 3">
             <a:extLst>
               <a:ext uri="{FF2B5EF4-FFF2-40B4-BE49-F238E27FC236}">
-                <a16:creationId xmlns:a16="http://schemas.microsoft.com/office/drawing/2014/main" id="{B219A3E9-6C03-C4BD-9922-36B8DAE96556}"/>
+                <a16:creationId xmlns:a16="http://schemas.microsoft.com/office/drawing/2014/main" id="{A09FEBD0-B28D-908C-5EDE-CADC9368308C}"/>
               </a:ext>
             </a:extLst>
           </p:cNvPr>
-          <p:cNvSpPr>
-            <a:spLocks noGrp="1"/>
-          </p:cNvSpPr>
-          <p:nvPr>
-            <p:ph idx="1"/>
-          </p:nvPr>
-        </p:nvSpPr>
-        <p:spPr/>
-        <p:txBody>
-          <a:bodyPr/>
-          <a:lstStyle/>
-          <a:p>
-            <a:r>
-              <a:rPr lang="en-US" dirty="0"/>
-              <a:t>THANK YOU</a:t>
-            </a:r>
-          </a:p>
-          <a:p>
-            <a:endParaRPr lang="en-US" dirty="0"/>
-          </a:p>
-          <a:p>
-            <a:pPr lvl="1"/>
-            <a:r>
-              <a:rPr lang="en-US" dirty="0"/>
-              <a:t>RACHAEL OSORO</a:t>
-            </a:r>
-          </a:p>
-          <a:p>
-            <a:pPr lvl="1"/>
-            <a:r>
-              <a:rPr lang="en-US" dirty="0">
-                <a:hlinkClick r:id="rId2"/>
-              </a:rPr>
-              <a:t>rachael.osoro@students.moringaschool.com</a:t>
-            </a:r>
-            <a:endParaRPr lang="en-US" dirty="0"/>
-          </a:p>
-          <a:p>
-            <a:pPr lvl="1"/>
-            <a:r>
-              <a:rPr lang="en-US" dirty="0" err="1"/>
-              <a:t>Github</a:t>
-            </a:r>
-            <a:r>
-              <a:rPr lang="en-US" dirty="0"/>
-              <a:t> Rachael-</a:t>
-            </a:r>
-            <a:r>
-              <a:rPr lang="en-US" dirty="0" err="1"/>
-              <a:t>Osoro</a:t>
-            </a:r>
-            <a:endParaRPr lang="en-US" dirty="0"/>
-          </a:p>
-          <a:p>
-            <a:pPr marL="0" indent="0">
-              <a:buNone/>
-            </a:pPr>
-            <a:br>
-              <a:rPr lang="en-US" dirty="0"/>
-            </a:br>
-            <a:endParaRPr lang="en-US" dirty="0"/>
+          <p:cNvSpPr txBox="1"/>
+          <p:nvPr/>
+        </p:nvSpPr>
+        <p:spPr>
+          <a:xfrm>
+            <a:off x="1972235" y="2519082"/>
+            <a:ext cx="9502589" cy="1384995"/>
+          </a:xfrm>
+          <a:prstGeom prst="rect">
+            <a:avLst/>
+          </a:prstGeom>
+          <a:noFill/>
+        </p:spPr>
+        <p:txBody>
+          <a:bodyPr wrap="square" rtlCol="0">
+            <a:spAutoFit/>
+          </a:bodyPr>
+          <a:lstStyle/>
+          <a:p>
+            <a:r>
+              <a:rPr lang="en-US" sz="2800" dirty="0"/>
+              <a:t>There are many other factors that may </a:t>
+            </a:r>
+            <a:r>
+              <a:rPr lang="en-US" sz="2800" dirty="0" err="1"/>
+              <a:t>favour</a:t>
+            </a:r>
+            <a:r>
+              <a:rPr lang="en-US" sz="2800" dirty="0"/>
+              <a:t> video production not discussed in this analysis.</a:t>
+            </a:r>
+          </a:p>
+          <a:p>
+            <a:endParaRPr lang="en-US" sz="2800" kern="1200" dirty="0">
+              <a:solidFill>
+                <a:schemeClr val="tx1"/>
+              </a:solidFill>
+              <a:latin typeface="+mn-lt"/>
+              <a:ea typeface="+mn-ea"/>
+              <a:cs typeface="+mn-cs"/>
+            </a:endParaRPr>
           </a:p>
         </p:txBody>
       </p:sp>
@@ -4694,7 +4469,7 @@
           <a:bodyPr/>
           <a:lstStyle/>
           <a:p>
-            <a:endParaRPr lang="en-US"/>
+            <a:endParaRPr lang="en-US" dirty="0"/>
           </a:p>
         </p:txBody>
       </p:sp>
@@ -4827,7 +4602,7 @@
         <p:spPr>
           <a:xfrm>
             <a:off x="1244184" y="224853"/>
-            <a:ext cx="9203961" cy="6041036"/>
+            <a:ext cx="9203961" cy="5801193"/>
           </a:xfrm>
           <a:prstGeom prst="rect">
             <a:avLst/>
@@ -4915,13 +4690,13 @@
         </p:nvSpPr>
         <p:spPr>
           <a:xfrm>
-            <a:off x="1524000" y="2848131"/>
-            <a:ext cx="9144000" cy="2409669"/>
+            <a:off x="1524000" y="3870108"/>
+            <a:ext cx="8716588" cy="1759727"/>
           </a:xfrm>
         </p:spPr>
         <p:txBody>
           <a:bodyPr>
-            <a:normAutofit/>
+            <a:noAutofit/>
           </a:bodyPr>
           <a:lstStyle/>
           <a:p>
@@ -4934,7 +4709,7 @@
               </a:spcAft>
             </a:pPr>
             <a:r>
-              <a:rPr lang="en-US" b="0" i="0" u="none" strike="noStrike" dirty="0">
+              <a:rPr lang="en-US" sz="2400" b="0" i="0" u="none" strike="noStrike" cap="none" dirty="0">
                 <a:solidFill>
                   <a:srgbClr val="616161"/>
                 </a:solidFill>
@@ -4943,15 +4718,15 @@
               </a:rPr>
               <a:t>This is a data analysis report on movies, their performance at the box office and factors that influence the success of movies .</a:t>
             </a:r>
-            <a:endParaRPr lang="en-US" b="0" dirty="0">
+            <a:endParaRPr lang="en-US" sz="2400" b="0" cap="none" dirty="0">
               <a:effectLst/>
             </a:endParaRPr>
           </a:p>
           <a:p>
             <a:br>
-              <a:rPr lang="en-US" dirty="0"/>
+              <a:rPr lang="en-US" sz="2400" cap="none" dirty="0"/>
             </a:br>
-            <a:endParaRPr lang="en-US" dirty="0"/>
+            <a:endParaRPr lang="en-US" sz="2400" cap="none" dirty="0"/>
           </a:p>
         </p:txBody>
       </p:sp>
@@ -5057,14 +4832,14 @@
               <a:buChar char="•"/>
             </a:pPr>
             <a:r>
-              <a:rPr lang="en-US" sz="2800" b="0" i="0" u="none" strike="noStrike" dirty="0">
+              <a:rPr lang="en-US" sz="2800" b="0" i="0" u="none" strike="noStrike" cap="none" dirty="0">
                 <a:solidFill>
                   <a:srgbClr val="616161"/>
                 </a:solidFill>
                 <a:effectLst/>
                 <a:latin typeface="Proxima Nova"/>
               </a:rPr>
-              <a:t>Business Problem</a:t>
+              <a:t>Business problem</a:t>
             </a:r>
           </a:p>
           <a:p>
@@ -5079,7 +4854,7 @@
               <a:buChar char="•"/>
             </a:pPr>
             <a:r>
-              <a:rPr lang="en-US" sz="2800" b="0" i="0" u="none" strike="noStrike" dirty="0">
+              <a:rPr lang="en-US" sz="2800" b="0" i="0" u="none" strike="noStrike" cap="none" dirty="0">
                 <a:solidFill>
                   <a:srgbClr val="616161"/>
                 </a:solidFill>
@@ -5101,7 +4876,7 @@
               <a:buChar char="•"/>
             </a:pPr>
             <a:r>
-              <a:rPr lang="en-US" sz="2800" b="0" i="0" u="none" strike="noStrike" dirty="0">
+              <a:rPr lang="en-US" sz="2800" b="0" i="0" u="none" strike="noStrike" cap="none" dirty="0">
                 <a:solidFill>
                   <a:srgbClr val="616161"/>
                 </a:solidFill>
@@ -5123,7 +4898,7 @@
               <a:buChar char="•"/>
             </a:pPr>
             <a:r>
-              <a:rPr lang="en-US" sz="2800" b="0" i="0" u="none" strike="noStrike" dirty="0">
+              <a:rPr lang="en-US" sz="2800" b="0" i="0" u="none" strike="noStrike" cap="none" dirty="0">
                 <a:solidFill>
                   <a:srgbClr val="616161"/>
                 </a:solidFill>
@@ -5145,7 +4920,7 @@
               <a:buChar char="•"/>
             </a:pPr>
             <a:r>
-              <a:rPr lang="en-US" sz="2800" b="0" i="0" u="none" strike="noStrike" dirty="0">
+              <a:rPr lang="en-US" sz="2800" b="0" i="0" u="none" strike="noStrike" cap="none" dirty="0">
                 <a:solidFill>
                   <a:srgbClr val="616161"/>
                 </a:solidFill>
@@ -5205,7 +4980,7 @@
         </p:nvSpPr>
         <p:spPr>
           <a:xfrm>
-            <a:off x="1524000" y="1122363"/>
+            <a:off x="1524000" y="279680"/>
             <a:ext cx="9144000" cy="1410975"/>
           </a:xfrm>
         </p:spPr>
@@ -5238,8 +5013,8 @@
         </p:nvSpPr>
         <p:spPr>
           <a:xfrm>
-            <a:off x="1494020" y="2668900"/>
-            <a:ext cx="9144000" cy="3357145"/>
+            <a:off x="1524000" y="1431771"/>
+            <a:ext cx="9144000" cy="4395288"/>
           </a:xfrm>
         </p:spPr>
         <p:txBody>
@@ -5257,36 +5032,16 @@
               </a:spcAft>
             </a:pPr>
             <a:r>
-              <a:rPr lang="en-US" sz="2000" b="0" i="0" u="none" strike="noStrike" dirty="0">
+              <a:rPr lang="en-US" sz="2000" b="0" i="0" u="none" strike="noStrike" cap="none" dirty="0">
                 <a:solidFill>
                   <a:srgbClr val="616161"/>
                 </a:solidFill>
                 <a:effectLst/>
                 <a:latin typeface="Proxima Nova"/>
               </a:rPr>
-              <a:t>Microsoft, has decided to create a new movie studio to tap into the </a:t>
-            </a:r>
-            <a:r>
-              <a:rPr lang="en-US" sz="2000" b="0" i="0" u="none" strike="noStrike" dirty="0" err="1">
-                <a:solidFill>
-                  <a:srgbClr val="616161"/>
-                </a:solidFill>
-                <a:effectLst/>
-                <a:latin typeface="Proxima Nova"/>
-              </a:rPr>
-              <a:t>HollywooD</a:t>
-            </a:r>
-            <a:r>
-              <a:rPr lang="en-US" sz="2000" b="0" i="0" u="none" strike="noStrike" dirty="0">
-                <a:solidFill>
-                  <a:srgbClr val="616161"/>
-                </a:solidFill>
-                <a:effectLst/>
-                <a:latin typeface="Proxima Nova"/>
-              </a:rPr>
-              <a:t> money.</a:t>
-            </a:r>
-            <a:endParaRPr lang="en-US" sz="2000" dirty="0"/>
+              <a:t>Microsoft, has decided to create a new movie studio to tap into the Hollywood money.</a:t>
+            </a:r>
+            <a:endParaRPr lang="en-US" sz="2000" cap="none" dirty="0"/>
           </a:p>
           <a:p>
             <a:pPr marL="342900" indent="-342900" rtl="0">
@@ -5300,16 +5055,16 @@
               <a:buChar char="•"/>
             </a:pPr>
             <a:r>
-              <a:rPr lang="en-US" sz="2000" b="0" i="0" u="none" strike="noStrike" dirty="0">
+              <a:rPr lang="en-US" sz="2000" b="0" i="0" u="none" strike="noStrike" cap="none" dirty="0">
                 <a:solidFill>
                   <a:srgbClr val="616161"/>
                 </a:solidFill>
                 <a:effectLst/>
                 <a:latin typeface="Proxima Nova"/>
               </a:rPr>
-              <a:t> which genre of movies offer higher returns?</a:t>
-            </a:r>
-            <a:endParaRPr lang="en-US" sz="2000" b="0" dirty="0">
+              <a:t> Which genre of movies offer higher returns?</a:t>
+            </a:r>
+            <a:endParaRPr lang="en-US" sz="2000" b="0" cap="none" dirty="0">
               <a:effectLst/>
             </a:endParaRPr>
           </a:p>
@@ -5325,7 +5080,7 @@
               <a:buChar char="•"/>
             </a:pPr>
             <a:r>
-              <a:rPr lang="en-US" sz="2000" b="0" i="0" u="none" strike="noStrike" dirty="0">
+              <a:rPr lang="en-US" sz="2000" b="0" i="0" u="none" strike="noStrike" cap="none" dirty="0">
                 <a:solidFill>
                   <a:srgbClr val="616161"/>
                 </a:solidFill>
@@ -5334,7 +5089,7 @@
               </a:rPr>
               <a:t>What time of the year should movies be released?</a:t>
             </a:r>
-            <a:endParaRPr lang="en-US" sz="2000" b="0" dirty="0">
+            <a:endParaRPr lang="en-US" sz="2000" b="0" cap="none" dirty="0">
               <a:effectLst/>
             </a:endParaRPr>
           </a:p>
@@ -5350,7 +5105,7 @@
               <a:buChar char="•"/>
             </a:pPr>
             <a:r>
-              <a:rPr lang="en-US" sz="2000" b="0" i="0" u="none" strike="noStrike" dirty="0">
+              <a:rPr lang="en-US" sz="2000" b="0" i="0" u="none" strike="noStrike" cap="none" dirty="0">
                 <a:solidFill>
                   <a:srgbClr val="616161"/>
                 </a:solidFill>
@@ -5359,7 +5114,7 @@
               </a:rPr>
               <a:t> Identify out the cost of production.</a:t>
             </a:r>
-            <a:endParaRPr lang="en-US" sz="2000" b="0" dirty="0">
+            <a:endParaRPr lang="en-US" sz="2000" b="0" cap="none" dirty="0">
               <a:effectLst/>
             </a:endParaRPr>
           </a:p>
@@ -5373,24 +5128,44 @@
               </a:spcAft>
             </a:pPr>
             <a:r>
-              <a:rPr lang="en-US" sz="2000" b="0" i="0" u="none" strike="noStrike" dirty="0">
+              <a:rPr lang="en-US" sz="2000" b="0" i="0" u="none" strike="noStrike" cap="none" dirty="0">
                 <a:solidFill>
                   <a:srgbClr val="616161"/>
                 </a:solidFill>
                 <a:effectLst/>
                 <a:latin typeface="Proxima Nova"/>
               </a:rPr>
-              <a:t>Before Microsoft can embark on movie creation, this analysis provides insights on successful movie genres, financial risks to be incurred and the most favourable durations to release movies throughout the year.</a:t>
-            </a:r>
-            <a:endParaRPr lang="en-US" sz="2000" b="0" dirty="0">
+              <a:t>Before Microsoft can embark on movie creation, this analysis provides insights on successful movie genres, financial risks to be incurred and the most </a:t>
+            </a:r>
+            <a:r>
+              <a:rPr lang="en-US" sz="2000" b="0" i="0" u="none" strike="noStrike" cap="none" dirty="0" err="1">
+                <a:solidFill>
+                  <a:srgbClr val="616161"/>
+                </a:solidFill>
+                <a:effectLst/>
+                <a:latin typeface="Proxima Nova"/>
+              </a:rPr>
+              <a:t>favourable</a:t>
+            </a:r>
+            <a:r>
+              <a:rPr lang="en-US" sz="2000" b="0" i="0" u="none" strike="noStrike" cap="none" dirty="0">
+                <a:solidFill>
+                  <a:srgbClr val="616161"/>
+                </a:solidFill>
+                <a:effectLst/>
+                <a:latin typeface="Proxima Nova"/>
+              </a:rPr>
+              <a:t> durations to release movies throughout the year.</a:t>
+            </a:r>
+            <a:endParaRPr lang="en-US" sz="2000" b="0" cap="none" dirty="0">
               <a:effectLst/>
             </a:endParaRPr>
           </a:p>
           <a:p>
             <a:br>
-              <a:rPr lang="en-US" sz="2000" dirty="0"/>
+              <a:rPr lang="en-US" sz="2000" cap="none" dirty="0"/>
             </a:br>
-            <a:endParaRPr lang="en-US" sz="2000" dirty="0"/>
+            <a:endParaRPr lang="en-US" sz="2000" cap="none" dirty="0"/>
           </a:p>
         </p:txBody>
       </p:sp>
@@ -5995,8 +5770,8 @@
         </p:blipFill>
         <p:spPr bwMode="auto">
           <a:xfrm>
-            <a:off x="2889121" y="2233534"/>
-            <a:ext cx="5934075" cy="3582649"/>
+            <a:off x="2889121" y="1978702"/>
+            <a:ext cx="6449751" cy="3837481"/>
           </a:xfrm>
           <a:prstGeom prst="rect">
             <a:avLst/>
@@ -6280,8 +6055,8 @@
         </p:blipFill>
         <p:spPr bwMode="auto">
           <a:xfrm>
-            <a:off x="967303" y="1708879"/>
-            <a:ext cx="4932488" cy="4344603"/>
+            <a:off x="344774" y="1708879"/>
+            <a:ext cx="5555017" cy="4344603"/>
           </a:xfrm>
           <a:prstGeom prst="rect">
             <a:avLst/>

</xml_diff>